<commit_message>
added readme file and github and youtube links
</commit_message>
<xml_diff>
--- a/Presentation1_cd.pptx
+++ b/Presentation1_cd.pptx
@@ -30,8 +30,8 @@
     <p:sldId id="268" r:id="rId21"/>
     <p:sldId id="283" r:id="rId22"/>
     <p:sldId id="282" r:id="rId23"/>
-    <p:sldId id="258" r:id="rId24"/>
-    <p:sldId id="259" r:id="rId25"/>
+    <p:sldId id="259" r:id="rId24"/>
+    <p:sldId id="284" r:id="rId25"/>
   </p:sldIdLst>
   <p:sldSz cx="12192000" cy="6858000"/>
   <p:notesSz cx="6858000" cy="9144000"/>
@@ -6501,7 +6501,7 @@
           <a:p>
             <a:r>
               <a:rPr lang="en-US" dirty="0" smtClean="0"/>
-              <a:t>Compiler</a:t>
+              <a:t>Runtime</a:t>
             </a:r>
             <a:endParaRPr lang="en-US" dirty="0"/>
           </a:p>
@@ -6520,87 +6520,95 @@
         <p:spPr/>
         <p:txBody>
           <a:bodyPr>
-            <a:normAutofit/>
+            <a:normAutofit lnSpcReduction="10000"/>
           </a:bodyPr>
           <a:lstStyle/>
           <a:p>
             <a:r>
-              <a:rPr lang="en-US" dirty="0" err="1" smtClean="0"/>
-              <a:t>Antlr</a:t>
-            </a:r>
-            <a:r>
-              <a:rPr lang="en-US" dirty="0" smtClean="0"/>
-              <a:t> 4 with Java</a:t>
+              <a:rPr lang="en-US" dirty="0" smtClean="0"/>
+              <a:t>Developed in Python</a:t>
+            </a:r>
+          </a:p>
+          <a:p>
+            <a:r>
+              <a:rPr lang="en-US" dirty="0" smtClean="0"/>
+              <a:t>Main function in the program is the start point</a:t>
+            </a:r>
+          </a:p>
+          <a:p>
+            <a:r>
+              <a:rPr lang="en-US" dirty="0" smtClean="0"/>
+              <a:t>Maintains two stacks</a:t>
             </a:r>
           </a:p>
           <a:p>
             <a:pPr lvl="1"/>
             <a:r>
               <a:rPr lang="en-US" dirty="0" smtClean="0"/>
-              <a:t>Parse tree generated</a:t>
+              <a:t>Instruction Pointer (EIP)</a:t>
             </a:r>
           </a:p>
           <a:p>
             <a:pPr lvl="1"/>
             <a:r>
               <a:rPr lang="en-US" dirty="0" smtClean="0"/>
-              <a:t>Extended visitor class generated by </a:t>
-            </a:r>
-            <a:r>
-              <a:rPr lang="en-US" dirty="0" err="1" smtClean="0"/>
-              <a:t>Antlr</a:t>
-            </a:r>
-            <a:r>
-              <a:rPr lang="en-US" dirty="0" smtClean="0"/>
-              <a:t> to parse tree and generate intermediate code</a:t>
+              <a:t>Symbol Table (Python Dictionary)</a:t>
+            </a:r>
+          </a:p>
+          <a:p>
+            <a:r>
+              <a:rPr lang="en-US" dirty="0" smtClean="0"/>
+              <a:t>Variable Resolution</a:t>
             </a:r>
           </a:p>
           <a:p>
             <a:pPr lvl="1"/>
             <a:r>
               <a:rPr lang="en-US" dirty="0" smtClean="0"/>
-              <a:t>Arithmetic Operations</a:t>
-            </a:r>
-          </a:p>
-          <a:p>
-            <a:pPr lvl="2"/>
-            <a:r>
-              <a:rPr lang="en-US" sz="1800" dirty="0" smtClean="0"/>
-              <a:t>Defined common registers to store intermediate result</a:t>
+              <a:t>Looks for a variable in symbol table of current scope</a:t>
             </a:r>
           </a:p>
           <a:p>
             <a:pPr lvl="1"/>
             <a:r>
               <a:rPr lang="en-US" dirty="0" smtClean="0"/>
-              <a:t>Relational Operator</a:t>
-            </a:r>
-          </a:p>
-          <a:p>
-            <a:pPr lvl="2"/>
-            <a:r>
-              <a:rPr lang="en-US" sz="1800" dirty="0" smtClean="0"/>
-              <a:t>Stores the result of operator in register R</a:t>
-            </a:r>
-          </a:p>
-          <a:p>
-            <a:pPr lvl="2"/>
-            <a:r>
-              <a:rPr lang="en-US" sz="1800" dirty="0" smtClean="0"/>
-              <a:t>R is used </a:t>
-            </a:r>
-            <a:r>
-              <a:rPr lang="en-US" sz="1800" dirty="0"/>
-              <a:t>by JNE (JUMP if not equal), JGE (JUMP if greater), JE (JUMP if equal) and JMP (is a unconditional JUMP) </a:t>
-            </a:r>
-            <a:endParaRPr lang="en-US" sz="1800" dirty="0" smtClean="0"/>
+              <a:t>If not found, searches for the variable in the parent scope until global scope.</a:t>
+            </a:r>
+          </a:p>
+          <a:p>
+            <a:r>
+              <a:rPr lang="en-US" dirty="0" smtClean="0"/>
+              <a:t>Function Call</a:t>
+            </a:r>
+          </a:p>
+          <a:p>
+            <a:pPr lvl="1"/>
+            <a:r>
+              <a:rPr lang="en-US" dirty="0" smtClean="0"/>
+              <a:t>Next EIP is stored and pushed into stack</a:t>
+            </a:r>
+          </a:p>
+          <a:p>
+            <a:pPr lvl="1"/>
+            <a:r>
+              <a:rPr lang="en-US" dirty="0" smtClean="0"/>
+              <a:t>New EIP and symbol table is created for the current function</a:t>
+            </a:r>
+          </a:p>
+          <a:p>
+            <a:pPr lvl="1"/>
+            <a:endParaRPr lang="en-US" dirty="0" smtClean="0"/>
+          </a:p>
+          <a:p>
+            <a:pPr lvl="1"/>
+            <a:endParaRPr lang="en-US" dirty="0"/>
           </a:p>
         </p:txBody>
       </p:sp>
     </p:spTree>
     <p:extLst>
       <p:ext uri="{BB962C8B-B14F-4D97-AF65-F5344CB8AC3E}">
-        <p14:creationId xmlns:p14="http://schemas.microsoft.com/office/powerpoint/2010/main" val="1741581203"/>
+        <p14:creationId xmlns:p14="http://schemas.microsoft.com/office/powerpoint/2010/main" val="137752804"/>
       </p:ext>
     </p:extLst>
   </p:cSld>
@@ -6643,8 +6651,20 @@
           <a:lstStyle/>
           <a:p>
             <a:r>
-              <a:rPr lang="en-US" dirty="0" smtClean="0"/>
-              <a:t>Runtime</a:t>
+              <a:rPr lang="en-US" dirty="0" err="1" smtClean="0"/>
+              <a:t>Youtube</a:t>
+            </a:r>
+            <a:r>
+              <a:rPr lang="en-US" dirty="0" smtClean="0"/>
+              <a:t> and </a:t>
+            </a:r>
+            <a:r>
+              <a:rPr lang="en-US" dirty="0" err="1" smtClean="0"/>
+              <a:t>Github</a:t>
+            </a:r>
+            <a:r>
+              <a:rPr lang="en-US" dirty="0" smtClean="0"/>
+              <a:t> Link</a:t>
             </a:r>
             <a:endParaRPr lang="en-US" dirty="0"/>
           </a:p>
@@ -6663,95 +6683,117 @@
         <p:spPr/>
         <p:txBody>
           <a:bodyPr>
-            <a:normAutofit lnSpcReduction="10000"/>
+            <a:normAutofit/>
           </a:bodyPr>
           <a:lstStyle/>
           <a:p>
-            <a:r>
-              <a:rPr lang="en-US" dirty="0" smtClean="0"/>
-              <a:t>Developed in Python</a:t>
-            </a:r>
-          </a:p>
-          <a:p>
-            <a:r>
-              <a:rPr lang="en-US" dirty="0" smtClean="0"/>
-              <a:t>Main function in the program is the start point</a:t>
-            </a:r>
-          </a:p>
-          <a:p>
-            <a:r>
-              <a:rPr lang="en-US" dirty="0" smtClean="0"/>
-              <a:t>Maintains two stacks</a:t>
-            </a:r>
-          </a:p>
-          <a:p>
-            <a:pPr lvl="1"/>
-            <a:r>
-              <a:rPr lang="en-US" dirty="0" smtClean="0"/>
-              <a:t>Instruction Pointer (EIP)</a:t>
-            </a:r>
-          </a:p>
-          <a:p>
-            <a:pPr lvl="1"/>
-            <a:r>
-              <a:rPr lang="en-US" dirty="0" smtClean="0"/>
-              <a:t>Symbol Table (Python Dictionary)</a:t>
-            </a:r>
-          </a:p>
-          <a:p>
-            <a:r>
-              <a:rPr lang="en-US" dirty="0" smtClean="0"/>
-              <a:t>Variable Resolution</a:t>
-            </a:r>
-          </a:p>
-          <a:p>
-            <a:pPr lvl="1"/>
-            <a:r>
-              <a:rPr lang="en-US" dirty="0" smtClean="0"/>
-              <a:t>Looks for a variable in symbol table of current scope</a:t>
-            </a:r>
-          </a:p>
-          <a:p>
-            <a:pPr lvl="1"/>
-            <a:r>
-              <a:rPr lang="en-US" dirty="0" smtClean="0"/>
-              <a:t>If not found, searches for the variable in the parent scope until global scope.</a:t>
-            </a:r>
-          </a:p>
-          <a:p>
-            <a:r>
-              <a:rPr lang="en-US" dirty="0" smtClean="0"/>
-              <a:t>Function Call</a:t>
-            </a:r>
-          </a:p>
-          <a:p>
-            <a:pPr lvl="1"/>
-            <a:r>
-              <a:rPr lang="en-US" dirty="0" smtClean="0"/>
-              <a:t>Next EIP is stored and pushed into stack</a:t>
-            </a:r>
-          </a:p>
-          <a:p>
-            <a:pPr lvl="1"/>
-            <a:r>
-              <a:rPr lang="en-US" dirty="0" smtClean="0"/>
-              <a:t>New EIP and symbol table is created for the current function</a:t>
-            </a:r>
-          </a:p>
-          <a:p>
-            <a:pPr lvl="1"/>
+            <a:pPr>
+              <a:buFont typeface="Courier New" panose="02070309020205020404" pitchFamily="49" charset="0"/>
+              <a:buChar char="o"/>
+            </a:pPr>
+            <a:r>
+              <a:rPr lang="en-US" sz="2400" dirty="0" smtClean="0"/>
+              <a:t> </a:t>
+            </a:r>
+            <a:r>
+              <a:rPr lang="en-US" sz="2400" dirty="0" err="1" smtClean="0"/>
+              <a:t>Youtube</a:t>
+            </a:r>
+            <a:r>
+              <a:rPr lang="en-US" sz="2400" dirty="0" smtClean="0"/>
+              <a:t> link </a:t>
+            </a:r>
+          </a:p>
+          <a:p>
+            <a:pPr marL="0" indent="0">
+              <a:buNone/>
+            </a:pPr>
+            <a:r>
+              <a:rPr lang="en-US" sz="2400" dirty="0"/>
+              <a:t>		- </a:t>
+            </a:r>
+            <a:r>
+              <a:rPr lang="en-US" sz="2400" dirty="0">
+                <a:hlinkClick r:id="rId2"/>
+              </a:rPr>
+              <a:t>https://</a:t>
+            </a:r>
+            <a:r>
+              <a:rPr lang="en-US" sz="2400" dirty="0" smtClean="0">
+                <a:hlinkClick r:id="rId2"/>
+              </a:rPr>
+              <a:t>www.youtube.com/watch?v=2nJaYDFsSGo</a:t>
+            </a:r>
+            <a:endParaRPr lang="en-US" sz="2400" dirty="0" smtClean="0"/>
+          </a:p>
+          <a:p>
+            <a:pPr>
+              <a:buFont typeface="Courier New" panose="02070309020205020404" pitchFamily="49" charset="0"/>
+              <a:buChar char="o"/>
+            </a:pPr>
+            <a:r>
+              <a:rPr lang="en-US" sz="2400" dirty="0"/>
+              <a:t> </a:t>
+            </a:r>
+            <a:r>
+              <a:rPr lang="en-US" sz="2400" dirty="0" err="1" smtClean="0"/>
+              <a:t>Github</a:t>
+            </a:r>
+            <a:r>
+              <a:rPr lang="en-US" sz="2400" dirty="0" smtClean="0"/>
+              <a:t> Repo link</a:t>
+            </a:r>
+          </a:p>
+          <a:p>
+            <a:pPr marL="1471400" lvl="8" indent="0">
+              <a:buNone/>
+            </a:pPr>
+            <a:r>
+              <a:rPr lang="en-US" dirty="0" smtClean="0"/>
+              <a:t>         </a:t>
+            </a:r>
+            <a:r>
+              <a:rPr lang="en-US" sz="2400" dirty="0"/>
+              <a:t>- </a:t>
+            </a:r>
+            <a:r>
+              <a:rPr lang="en-US" sz="2400" dirty="0">
+                <a:hlinkClick r:id="rId3"/>
+              </a:rPr>
+              <a:t>https://</a:t>
+            </a:r>
+            <a:r>
+              <a:rPr lang="en-US" sz="2400" dirty="0" smtClean="0">
+                <a:hlinkClick r:id="rId3"/>
+              </a:rPr>
+              <a:t>github.com/Jyotinder/JAJ</a:t>
+            </a:r>
+            <a:endParaRPr lang="en-US" sz="2400" dirty="0" smtClean="0"/>
+          </a:p>
+          <a:p>
+            <a:pPr marL="1471400" lvl="8" indent="0">
+              <a:buNone/>
+            </a:pPr>
             <a:endParaRPr lang="en-US" dirty="0" smtClean="0"/>
           </a:p>
           <a:p>
-            <a:pPr lvl="1"/>
-            <a:endParaRPr lang="en-US" dirty="0"/>
+            <a:pPr marL="0" indent="0">
+              <a:buNone/>
+            </a:pPr>
+            <a:endParaRPr lang="en-US" sz="2400" dirty="0" smtClean="0"/>
+          </a:p>
+          <a:p>
+            <a:pPr marL="0" indent="0">
+              <a:buNone/>
+            </a:pPr>
+            <a:endParaRPr lang="en-US" sz="2400" dirty="0"/>
           </a:p>
         </p:txBody>
       </p:sp>
     </p:spTree>
     <p:extLst>
       <p:ext uri="{BB962C8B-B14F-4D97-AF65-F5344CB8AC3E}">
-        <p14:creationId xmlns:p14="http://schemas.microsoft.com/office/powerpoint/2010/main" val="137752804"/>
+        <p14:creationId xmlns:p14="http://schemas.microsoft.com/office/powerpoint/2010/main" val="2882325942"/>
       </p:ext>
     </p:extLst>
   </p:cSld>
@@ -7231,14 +7273,13 @@
               <a:buNone/>
             </a:pPr>
             <a:r>
-              <a:rPr lang="en-US"/>
+              <a:rPr lang="en-US" dirty="0"/>
               <a:t>	</a:t>
             </a:r>
             <a:r>
-              <a:rPr lang="en-US" smtClean="0"/>
+              <a:rPr lang="en-US" dirty="0" smtClean="0"/>
               <a:t>			}</a:t>
             </a:r>
-            <a:endParaRPr lang="en-US" dirty="0" smtClean="0"/>
           </a:p>
           <a:p>
             <a:pPr>

</xml_diff>